<commit_message>
Set new slide transition
</commit_message>
<xml_diff>
--- a/Building SPAs in SharePoint Using AngularJS.pptx
+++ b/Building SPAs in SharePoint Using AngularJS.pptx
@@ -4501,8 +4501,8 @@
     <dgm:cxn modelId="{BAD6D932-295D-4B11-AB4F-C6A51681FEBF}" type="presOf" srcId="{CF2E496F-FE56-4416-B846-DC12E4577A57}" destId="{17A1F249-6BEF-4F56-A4D8-8470A1E98F15}" srcOrd="0" destOrd="4" presId="urn:microsoft.com/office/officeart/2005/8/layout/hProcess9"/>
     <dgm:cxn modelId="{EA0EE867-287C-4759-B04B-1A44DD272934}" srcId="{EB74A234-8CAB-45D0-A223-6A45EB9687CD}" destId="{73AD9478-DFBD-45AE-8C86-9F4CB3BB1065}" srcOrd="2" destOrd="0" parTransId="{9746DDD7-C15A-4CDE-A7A9-ECC7812B47E4}" sibTransId="{B69AF354-070B-44D2-9041-ADEA0B558672}"/>
     <dgm:cxn modelId="{04F02849-7425-4E1F-898E-FA7DF4ED9666}" srcId="{95A2F766-9D02-45F9-8F0E-E4477259B64E}" destId="{7BAE7899-E3C2-4B98-B54B-7CF98FABE6C9}" srcOrd="1" destOrd="0" parTransId="{6A4813D0-9A5E-4C8A-8814-6B3627CFB165}" sibTransId="{F555F416-CF8C-46B6-A6CB-31C043865330}"/>
+    <dgm:cxn modelId="{4B256FB0-F8A6-4FC7-9768-1B5644FB9597}" srcId="{95A2F766-9D02-45F9-8F0E-E4477259B64E}" destId="{06ABEAEB-0AB1-4B03-9DB2-1747D846F76E}" srcOrd="2" destOrd="0" parTransId="{39D41540-6B5A-4F2C-B728-B10955AEA6F0}" sibTransId="{31BEE491-4EB9-4240-BAFF-E839945F6CC2}"/>
     <dgm:cxn modelId="{06CBBF6D-5C60-4E24-85FE-3D72B5DF292D}" type="presOf" srcId="{D025C9CA-C276-4620-8793-4C01C8D3C8C5}" destId="{17A1F249-6BEF-4F56-A4D8-8470A1E98F15}" srcOrd="0" destOrd="5" presId="urn:microsoft.com/office/officeart/2005/8/layout/hProcess9"/>
-    <dgm:cxn modelId="{4B256FB0-F8A6-4FC7-9768-1B5644FB9597}" srcId="{95A2F766-9D02-45F9-8F0E-E4477259B64E}" destId="{06ABEAEB-0AB1-4B03-9DB2-1747D846F76E}" srcOrd="2" destOrd="0" parTransId="{39D41540-6B5A-4F2C-B728-B10955AEA6F0}" sibTransId="{31BEE491-4EB9-4240-BAFF-E839945F6CC2}"/>
     <dgm:cxn modelId="{56E07505-5528-42D2-BF65-AC0B13049BD5}" srcId="{06ABEAEB-0AB1-4B03-9DB2-1747D846F76E}" destId="{DAD5068A-7091-420C-87F0-598961455E7C}" srcOrd="0" destOrd="0" parTransId="{E2E48095-73D9-45CE-B1F4-5CC208A04174}" sibTransId="{6BA6DC11-1A25-4A5E-A262-45E03AB8968F}"/>
     <dgm:cxn modelId="{597B6F7A-1AB8-7A40-A88C-F20BDA8446CA}" type="presOf" srcId="{3D2CA84F-7F83-488E-9CE9-2466A7E58E8C}" destId="{C5C479F1-027C-425C-A0B3-5734FC2D9DF4}" srcOrd="0" destOrd="3" presId="urn:microsoft.com/office/officeart/2005/8/layout/hProcess9"/>
     <dgm:cxn modelId="{0E8AE683-6858-4ECC-8F94-9CB028DF1605}" srcId="{7BAE7899-E3C2-4B98-B54B-7CF98FABE6C9}" destId="{9D1C7FDD-1C7E-4F92-A303-4A4F612A191B}" srcOrd="0" destOrd="0" parTransId="{CE3951D3-C82F-4197-BB44-E4023C884400}" sibTransId="{78BC0FB8-1233-449C-947F-C73B9E9738DF}"/>
@@ -10183,7 +10183,7 @@
           <a:p>
             <a:fld id="{061C5132-FFA3-4B02-9F09-22FCF40EFA74}" type="datetimeFigureOut">
               <a:rPr lang="en-US" smtClean="0"/>
-              <a:t>7/11/15</a:t>
+              <a:t>7/13/15</a:t>
             </a:fld>
             <a:endParaRPr lang="en-US"/>
           </a:p>
@@ -10348,7 +10348,7 @@
           <a:p>
             <a:fld id="{0B6E42C9-243F-4DC5-AFF6-9D56B5FA9D63}" type="datetimeFigureOut">
               <a:rPr lang="en-US" smtClean="0"/>
-              <a:t>7/11/15</a:t>
+              <a:t>7/13/15</a:t>
             </a:fld>
             <a:endParaRPr lang="en-US"/>
           </a:p>
@@ -11187,7 +11187,7 @@
           <a:p>
             <a:fld id="{48A87A34-81AB-432B-8DAE-1953F412C126}" type="datetimeFigureOut">
               <a:rPr lang="en-US" smtClean="0"/>
-              <a:t>7/11/15</a:t>
+              <a:t>7/13/15</a:t>
             </a:fld>
             <a:endParaRPr lang="en-US" dirty="0"/>
           </a:p>
@@ -11518,7 +11518,7 @@
           <a:p>
             <a:fld id="{48A87A34-81AB-432B-8DAE-1953F412C126}" type="datetimeFigureOut">
               <a:rPr lang="en-US" smtClean="0"/>
-              <a:t>7/11/15</a:t>
+              <a:t>7/13/15</a:t>
             </a:fld>
             <a:endParaRPr lang="en-US" dirty="0"/>
           </a:p>
@@ -11751,7 +11751,7 @@
           <a:p>
             <a:fld id="{48A87A34-81AB-432B-8DAE-1953F412C126}" type="datetimeFigureOut">
               <a:rPr lang="en-US" smtClean="0"/>
-              <a:t>7/11/15</a:t>
+              <a:t>7/13/15</a:t>
             </a:fld>
             <a:endParaRPr lang="en-US" dirty="0"/>
           </a:p>
@@ -12053,7 +12053,7 @@
           <a:p>
             <a:fld id="{48A87A34-81AB-432B-8DAE-1953F412C126}" type="datetimeFigureOut">
               <a:rPr lang="en-US" smtClean="0"/>
-              <a:t>7/11/15</a:t>
+              <a:t>7/13/15</a:t>
             </a:fld>
             <a:endParaRPr lang="en-US" dirty="0"/>
           </a:p>
@@ -12518,7 +12518,7 @@
           <a:p>
             <a:fld id="{48A87A34-81AB-432B-8DAE-1953F412C126}" type="datetimeFigureOut">
               <a:rPr lang="en-US" smtClean="0"/>
-              <a:t>7/11/15</a:t>
+              <a:t>7/13/15</a:t>
             </a:fld>
             <a:endParaRPr lang="en-US" dirty="0"/>
           </a:p>
@@ -13105,7 +13105,7 @@
           <a:p>
             <a:fld id="{48A87A34-81AB-432B-8DAE-1953F412C126}" type="datetimeFigureOut">
               <a:rPr lang="en-US" smtClean="0"/>
-              <a:t>7/11/15</a:t>
+              <a:t>7/13/15</a:t>
             </a:fld>
             <a:endParaRPr lang="en-US" dirty="0"/>
           </a:p>
@@ -13968,7 +13968,7 @@
           <a:p>
             <a:fld id="{48A87A34-81AB-432B-8DAE-1953F412C126}" type="datetimeFigureOut">
               <a:rPr lang="en-US" smtClean="0"/>
-              <a:t>7/11/15</a:t>
+              <a:t>7/13/15</a:t>
             </a:fld>
             <a:endParaRPr lang="en-US" dirty="0"/>
           </a:p>
@@ -14184,7 +14184,7 @@
           <a:p>
             <a:fld id="{B0FE2824-C2A0-4931-BB32-60B24BDBB3CC}" type="datetimeFigureOut">
               <a:rPr lang="en-US" smtClean="0"/>
-              <a:t>7/11/15</a:t>
+              <a:t>7/13/15</a:t>
             </a:fld>
             <a:endParaRPr lang="en-US"/>
           </a:p>
@@ -14417,7 +14417,7 @@
           <a:p>
             <a:fld id="{B0FE2824-C2A0-4931-BB32-60B24BDBB3CC}" type="datetimeFigureOut">
               <a:rPr lang="en-US" smtClean="0"/>
-              <a:t>7/11/15</a:t>
+              <a:t>7/13/15</a:t>
             </a:fld>
             <a:endParaRPr lang="en-US"/>
           </a:p>
@@ -14721,7 +14721,7 @@
           <a:p>
             <a:fld id="{B0FE2824-C2A0-4931-BB32-60B24BDBB3CC}" type="datetimeFigureOut">
               <a:rPr lang="en-US" smtClean="0"/>
-              <a:t>7/11/15</a:t>
+              <a:t>7/13/15</a:t>
             </a:fld>
             <a:endParaRPr lang="en-US"/>
           </a:p>
@@ -15020,7 +15020,7 @@
           <a:p>
             <a:fld id="{48A87A34-81AB-432B-8DAE-1953F412C126}" type="datetimeFigureOut">
               <a:rPr lang="en-US" smtClean="0"/>
-              <a:t>7/11/15</a:t>
+              <a:t>7/13/15</a:t>
             </a:fld>
             <a:endParaRPr lang="en-US" dirty="0"/>
           </a:p>
@@ -15306,7 +15306,7 @@
           <a:p>
             <a:fld id="{B0FE2824-C2A0-4931-BB32-60B24BDBB3CC}" type="datetimeFigureOut">
               <a:rPr lang="en-US" smtClean="0"/>
-              <a:t>7/11/15</a:t>
+              <a:t>7/13/15</a:t>
             </a:fld>
             <a:endParaRPr lang="en-US"/>
           </a:p>
@@ -15740,7 +15740,7 @@
           <a:p>
             <a:fld id="{B0FE2824-C2A0-4931-BB32-60B24BDBB3CC}" type="datetimeFigureOut">
               <a:rPr lang="en-US" smtClean="0"/>
-              <a:t>7/11/15</a:t>
+              <a:t>7/13/15</a:t>
             </a:fld>
             <a:endParaRPr lang="en-US"/>
           </a:p>
@@ -15907,7 +15907,7 @@
           <a:p>
             <a:fld id="{B0FE2824-C2A0-4931-BB32-60B24BDBB3CC}" type="datetimeFigureOut">
               <a:rPr lang="en-US" smtClean="0"/>
-              <a:t>7/11/15</a:t>
+              <a:t>7/13/15</a:t>
             </a:fld>
             <a:endParaRPr lang="en-US"/>
           </a:p>
@@ -16051,7 +16051,7 @@
           <a:p>
             <a:fld id="{B0FE2824-C2A0-4931-BB32-60B24BDBB3CC}" type="datetimeFigureOut">
               <a:rPr lang="en-US" smtClean="0"/>
-              <a:t>7/11/15</a:t>
+              <a:t>7/13/15</a:t>
             </a:fld>
             <a:endParaRPr lang="en-US"/>
           </a:p>
@@ -16349,7 +16349,7 @@
           <a:p>
             <a:fld id="{B0FE2824-C2A0-4931-BB32-60B24BDBB3CC}" type="datetimeFigureOut">
               <a:rPr lang="en-US" smtClean="0"/>
-              <a:t>7/11/15</a:t>
+              <a:t>7/13/15</a:t>
             </a:fld>
             <a:endParaRPr lang="en-US"/>
           </a:p>
@@ -16680,7 +16680,7 @@
           <a:p>
             <a:fld id="{B0FE2824-C2A0-4931-BB32-60B24BDBB3CC}" type="datetimeFigureOut">
               <a:rPr lang="en-US" smtClean="0"/>
-              <a:t>7/11/15</a:t>
+              <a:t>7/13/15</a:t>
             </a:fld>
             <a:endParaRPr lang="en-US"/>
           </a:p>
@@ -16953,7 +16953,7 @@
             <a:fld id="{48A87A34-81AB-432B-8DAE-1953F412C126}" type="datetimeFigureOut">
               <a:rPr lang="en-US" smtClean="0"/>
               <a:pPr/>
-              <a:t>7/11/15</a:t>
+              <a:t>7/13/15</a:t>
             </a:fld>
             <a:endParaRPr lang="en-US" dirty="0"/>
           </a:p>
@@ -17616,14 +17616,14 @@
   <p:clrMapOvr>
     <a:masterClrMapping/>
   </p:clrMapOvr>
-  <mc:AlternateContent xmlns:mc="http://schemas.openxmlformats.org/markup-compatibility/2006" xmlns:p14="http://schemas.microsoft.com/office/powerpoint/2010/main">
-    <mc:Choice Requires="p14">
-      <p:transition spd="med" p14:dur="700">
-        <p:fade/>
+  <mc:AlternateContent xmlns:mc="http://schemas.openxmlformats.org/markup-compatibility/2006">
+    <mc:Choice xmlns:p14="http://schemas.microsoft.com/office/powerpoint/2010/main" Requires="p14">
+      <p:transition spd="slow" p14:dur="1500">
+        <p14:window dir="vert"/>
       </p:transition>
     </mc:Choice>
-    <mc:Fallback xmlns="">
-      <p:transition spd="med">
+    <mc:Fallback>
+      <p:transition spd="slow">
         <p:fade/>
       </p:transition>
     </mc:Fallback>
@@ -18094,14 +18094,14 @@
   <p:clrMapOvr>
     <a:masterClrMapping/>
   </p:clrMapOvr>
-  <mc:AlternateContent xmlns:mc="http://schemas.openxmlformats.org/markup-compatibility/2006" xmlns:p14="http://schemas.microsoft.com/office/powerpoint/2010/main">
-    <mc:Choice Requires="p14">
-      <p:transition spd="med" p14:dur="700">
-        <p:fade/>
+  <mc:AlternateContent xmlns:mc="http://schemas.openxmlformats.org/markup-compatibility/2006">
+    <mc:Choice xmlns:p14="http://schemas.microsoft.com/office/powerpoint/2010/main" Requires="p14">
+      <p:transition spd="slow" p14:dur="1500">
+        <p14:window dir="vert"/>
       </p:transition>
     </mc:Choice>
-    <mc:Fallback xmlns="">
-      <p:transition spd="med">
+    <mc:Fallback>
+      <p:transition spd="slow">
         <p:fade/>
       </p:transition>
     </mc:Fallback>
@@ -18703,14 +18703,14 @@
   <p:clrMapOvr>
     <a:masterClrMapping/>
   </p:clrMapOvr>
-  <mc:AlternateContent xmlns:mc="http://schemas.openxmlformats.org/markup-compatibility/2006" xmlns:p14="http://schemas.microsoft.com/office/powerpoint/2010/main">
-    <mc:Choice Requires="p14">
-      <p:transition spd="med" p14:dur="700">
-        <p:fade/>
+  <mc:AlternateContent xmlns:mc="http://schemas.openxmlformats.org/markup-compatibility/2006">
+    <mc:Choice xmlns:p14="http://schemas.microsoft.com/office/powerpoint/2010/main" Requires="p14">
+      <p:transition spd="slow" p14:dur="1500">
+        <p14:window dir="vert"/>
       </p:transition>
     </mc:Choice>
-    <mc:Fallback xmlns="">
-      <p:transition spd="med">
+    <mc:Fallback>
+      <p:transition spd="slow">
         <p:fade/>
       </p:transition>
     </mc:Fallback>
@@ -19621,14 +19621,14 @@
   <p:clrMapOvr>
     <a:masterClrMapping/>
   </p:clrMapOvr>
-  <mc:AlternateContent xmlns:mc="http://schemas.openxmlformats.org/markup-compatibility/2006" xmlns:p14="http://schemas.microsoft.com/office/powerpoint/2010/main">
-    <mc:Choice Requires="p14">
-      <p:transition spd="med" p14:dur="700">
-        <p:fade/>
+  <mc:AlternateContent xmlns:mc="http://schemas.openxmlformats.org/markup-compatibility/2006">
+    <mc:Choice xmlns:p14="http://schemas.microsoft.com/office/powerpoint/2010/main" Requires="p14">
+      <p:transition spd="slow" p14:dur="1500">
+        <p14:window dir="vert"/>
       </p:transition>
     </mc:Choice>
-    <mc:Fallback xmlns="">
-      <p:transition spd="med">
+    <mc:Fallback>
+      <p:transition spd="slow">
         <p:fade/>
       </p:transition>
     </mc:Fallback>
@@ -19758,14 +19758,14 @@
   <p:clrMapOvr>
     <a:masterClrMapping/>
   </p:clrMapOvr>
-  <mc:AlternateContent xmlns:mc="http://schemas.openxmlformats.org/markup-compatibility/2006" xmlns:p14="http://schemas.microsoft.com/office/powerpoint/2010/main">
-    <mc:Choice Requires="p14">
-      <p:transition spd="med" p14:dur="700">
-        <p:fade/>
+  <mc:AlternateContent xmlns:mc="http://schemas.openxmlformats.org/markup-compatibility/2006">
+    <mc:Choice xmlns:p14="http://schemas.microsoft.com/office/powerpoint/2010/main" Requires="p14">
+      <p:transition spd="slow" p14:dur="1500">
+        <p14:window dir="vert"/>
       </p:transition>
     </mc:Choice>
-    <mc:Fallback xmlns="">
-      <p:transition spd="med">
+    <mc:Fallback>
+      <p:transition spd="slow">
         <p:fade/>
       </p:transition>
     </mc:Fallback>
@@ -19926,14 +19926,14 @@
   <p:clrMapOvr>
     <a:masterClrMapping/>
   </p:clrMapOvr>
-  <mc:AlternateContent xmlns:mc="http://schemas.openxmlformats.org/markup-compatibility/2006" xmlns:p14="http://schemas.microsoft.com/office/powerpoint/2010/main">
-    <mc:Choice Requires="p14">
-      <p:transition spd="med" p14:dur="700">
-        <p:fade/>
+  <mc:AlternateContent xmlns:mc="http://schemas.openxmlformats.org/markup-compatibility/2006">
+    <mc:Choice xmlns:p14="http://schemas.microsoft.com/office/powerpoint/2010/main" Requires="p14">
+      <p:transition spd="slow" p14:dur="1500">
+        <p14:window dir="vert"/>
       </p:transition>
     </mc:Choice>
-    <mc:Fallback xmlns="">
-      <p:transition spd="med">
+    <mc:Fallback>
+      <p:transition spd="slow">
         <p:fade/>
       </p:transition>
     </mc:Fallback>
@@ -20056,14 +20056,14 @@
   <p:clrMapOvr>
     <a:masterClrMapping/>
   </p:clrMapOvr>
-  <mc:AlternateContent xmlns:mc="http://schemas.openxmlformats.org/markup-compatibility/2006" xmlns:p14="http://schemas.microsoft.com/office/powerpoint/2010/main">
-    <mc:Choice Requires="p14">
-      <p:transition spd="med" p14:dur="700">
-        <p:fade/>
+  <mc:AlternateContent xmlns:mc="http://schemas.openxmlformats.org/markup-compatibility/2006">
+    <mc:Choice xmlns:p14="http://schemas.microsoft.com/office/powerpoint/2010/main" Requires="p14">
+      <p:transition spd="slow" p14:dur="1500">
+        <p14:window dir="vert"/>
       </p:transition>
     </mc:Choice>
-    <mc:Fallback xmlns="">
-      <p:transition spd="med">
+    <mc:Fallback>
+      <p:transition spd="slow">
         <p:fade/>
       </p:transition>
     </mc:Fallback>
@@ -20211,14 +20211,14 @@
   <p:clrMapOvr>
     <a:masterClrMapping/>
   </p:clrMapOvr>
-  <mc:AlternateContent xmlns:mc="http://schemas.openxmlformats.org/markup-compatibility/2006" xmlns:p14="http://schemas.microsoft.com/office/powerpoint/2010/main">
-    <mc:Choice Requires="p14">
-      <p:transition spd="med" p14:dur="700">
-        <p:fade/>
+  <mc:AlternateContent xmlns:mc="http://schemas.openxmlformats.org/markup-compatibility/2006">
+    <mc:Choice xmlns:p14="http://schemas.microsoft.com/office/powerpoint/2010/main" Requires="p14">
+      <p:transition spd="slow" p14:dur="1500">
+        <p14:window dir="vert"/>
       </p:transition>
     </mc:Choice>
-    <mc:Fallback xmlns="">
-      <p:transition spd="med">
+    <mc:Fallback>
+      <p:transition spd="slow">
         <p:fade/>
       </p:transition>
     </mc:Fallback>
@@ -20295,14 +20295,14 @@
   <p:clrMapOvr>
     <a:masterClrMapping/>
   </p:clrMapOvr>
-  <mc:AlternateContent xmlns:mc="http://schemas.openxmlformats.org/markup-compatibility/2006" xmlns:p14="http://schemas.microsoft.com/office/powerpoint/2010/main">
-    <mc:Choice Requires="p14">
-      <p:transition spd="med" p14:dur="700">
-        <p:fade/>
+  <mc:AlternateContent xmlns:mc="http://schemas.openxmlformats.org/markup-compatibility/2006">
+    <mc:Choice xmlns:p14="http://schemas.microsoft.com/office/powerpoint/2010/main" Requires="p14">
+      <p:transition spd="slow" p14:dur="1500">
+        <p14:window dir="vert"/>
       </p:transition>
     </mc:Choice>
-    <mc:Fallback xmlns="">
-      <p:transition spd="med">
+    <mc:Fallback>
+      <p:transition spd="slow">
         <p:fade/>
       </p:transition>
     </mc:Fallback>
@@ -20471,14 +20471,14 @@
   <p:clrMapOvr>
     <a:masterClrMapping/>
   </p:clrMapOvr>
-  <mc:AlternateContent xmlns:mc="http://schemas.openxmlformats.org/markup-compatibility/2006" xmlns:p14="http://schemas.microsoft.com/office/powerpoint/2010/main">
-    <mc:Choice Requires="p14">
-      <p:transition spd="med" p14:dur="700">
-        <p:fade/>
+  <mc:AlternateContent xmlns:mc="http://schemas.openxmlformats.org/markup-compatibility/2006">
+    <mc:Choice xmlns:p14="http://schemas.microsoft.com/office/powerpoint/2010/main" Requires="p14">
+      <p:transition spd="slow" p14:dur="1500">
+        <p14:window dir="vert"/>
       </p:transition>
     </mc:Choice>
-    <mc:Fallback xmlns="">
-      <p:transition spd="med">
+    <mc:Fallback>
+      <p:transition spd="slow">
         <p:fade/>
       </p:transition>
     </mc:Fallback>
@@ -20661,14 +20661,14 @@
   <p:clrMapOvr>
     <a:masterClrMapping/>
   </p:clrMapOvr>
-  <mc:AlternateContent xmlns:mc="http://schemas.openxmlformats.org/markup-compatibility/2006" xmlns:p14="http://schemas.microsoft.com/office/powerpoint/2010/main">
-    <mc:Choice Requires="p14">
-      <p:transition spd="med" p14:dur="700">
-        <p:fade/>
+  <mc:AlternateContent xmlns:mc="http://schemas.openxmlformats.org/markup-compatibility/2006">
+    <mc:Choice xmlns:p14="http://schemas.microsoft.com/office/powerpoint/2010/main" Requires="p14">
+      <p:transition spd="slow" p14:dur="1500">
+        <p14:window dir="vert"/>
       </p:transition>
     </mc:Choice>
-    <mc:Fallback xmlns="">
-      <p:transition spd="med">
+    <mc:Fallback>
+      <p:transition spd="slow">
         <p:fade/>
       </p:transition>
     </mc:Fallback>
@@ -21068,14 +21068,14 @@
   <p:clrMapOvr>
     <a:masterClrMapping/>
   </p:clrMapOvr>
-  <mc:AlternateContent xmlns:mc="http://schemas.openxmlformats.org/markup-compatibility/2006" xmlns:p14="http://schemas.microsoft.com/office/powerpoint/2010/main">
-    <mc:Choice Requires="p14">
-      <p:transition spd="med" p14:dur="700">
-        <p:fade/>
+  <mc:AlternateContent xmlns:mc="http://schemas.openxmlformats.org/markup-compatibility/2006">
+    <mc:Choice xmlns:p14="http://schemas.microsoft.com/office/powerpoint/2010/main" Requires="p14">
+      <p:transition spd="slow" p14:dur="1500">
+        <p14:window dir="vert"/>
       </p:transition>
     </mc:Choice>
-    <mc:Fallback xmlns="">
-      <p:transition spd="med">
+    <mc:Fallback>
+      <p:transition spd="slow">
         <p:fade/>
       </p:transition>
     </mc:Fallback>
@@ -21214,14 +21214,14 @@
   <p:clrMapOvr>
     <a:masterClrMapping/>
   </p:clrMapOvr>
-  <mc:AlternateContent xmlns:mc="http://schemas.openxmlformats.org/markup-compatibility/2006" xmlns:p14="http://schemas.microsoft.com/office/powerpoint/2010/main">
-    <mc:Choice Requires="p14">
-      <p:transition spd="med" p14:dur="700">
-        <p:fade/>
+  <mc:AlternateContent xmlns:mc="http://schemas.openxmlformats.org/markup-compatibility/2006">
+    <mc:Choice xmlns:p14="http://schemas.microsoft.com/office/powerpoint/2010/main" Requires="p14">
+      <p:transition spd="slow" p14:dur="1500">
+        <p14:window dir="vert"/>
       </p:transition>
     </mc:Choice>
-    <mc:Fallback xmlns="">
-      <p:transition spd="med">
+    <mc:Fallback>
+      <p:transition spd="slow">
         <p:fade/>
       </p:transition>
     </mc:Fallback>
@@ -21430,14 +21430,14 @@
   <p:clrMapOvr>
     <a:masterClrMapping/>
   </p:clrMapOvr>
-  <mc:AlternateContent xmlns:mc="http://schemas.openxmlformats.org/markup-compatibility/2006" xmlns:p14="http://schemas.microsoft.com/office/powerpoint/2010/main">
-    <mc:Choice Requires="p14">
-      <p:transition spd="med" p14:dur="700">
-        <p:fade/>
+  <mc:AlternateContent xmlns:mc="http://schemas.openxmlformats.org/markup-compatibility/2006">
+    <mc:Choice xmlns:p14="http://schemas.microsoft.com/office/powerpoint/2010/main" Requires="p14">
+      <p:transition spd="slow" p14:dur="1500">
+        <p14:window dir="vert"/>
       </p:transition>
     </mc:Choice>
-    <mc:Fallback xmlns="">
-      <p:transition spd="med">
+    <mc:Fallback>
+      <p:transition spd="slow">
         <p:fade/>
       </p:transition>
     </mc:Fallback>
@@ -21521,14 +21521,14 @@
   <p:clrMapOvr>
     <a:masterClrMapping/>
   </p:clrMapOvr>
-  <mc:AlternateContent xmlns:mc="http://schemas.openxmlformats.org/markup-compatibility/2006" xmlns:p14="http://schemas.microsoft.com/office/powerpoint/2010/main">
-    <mc:Choice Requires="p14">
-      <p:transition spd="med" p14:dur="700">
-        <p:fade/>
+  <mc:AlternateContent xmlns:mc="http://schemas.openxmlformats.org/markup-compatibility/2006">
+    <mc:Choice xmlns:p14="http://schemas.microsoft.com/office/powerpoint/2010/main" Requires="p14">
+      <p:transition spd="slow" p14:dur="1500">
+        <p14:window dir="vert"/>
       </p:transition>
     </mc:Choice>
-    <mc:Fallback xmlns="">
-      <p:transition spd="med">
+    <mc:Fallback>
+      <p:transition spd="slow">
         <p:fade/>
       </p:transition>
     </mc:Fallback>
@@ -21612,14 +21612,14 @@
   <p:clrMapOvr>
     <a:masterClrMapping/>
   </p:clrMapOvr>
-  <mc:AlternateContent xmlns:mc="http://schemas.openxmlformats.org/markup-compatibility/2006" xmlns:p14="http://schemas.microsoft.com/office/powerpoint/2010/main">
-    <mc:Choice Requires="p14">
-      <p:transition spd="med" p14:dur="700">
-        <p:fade/>
+  <mc:AlternateContent xmlns:mc="http://schemas.openxmlformats.org/markup-compatibility/2006">
+    <mc:Choice xmlns:p14="http://schemas.microsoft.com/office/powerpoint/2010/main" Requires="p14">
+      <p:transition spd="slow" p14:dur="1500">
+        <p14:window dir="vert"/>
       </p:transition>
     </mc:Choice>
-    <mc:Fallback xmlns="">
-      <p:transition spd="med">
+    <mc:Fallback>
+      <p:transition spd="slow">
         <p:fade/>
       </p:transition>
     </mc:Fallback>
@@ -21709,14 +21709,14 @@
   <p:clrMapOvr>
     <a:masterClrMapping/>
   </p:clrMapOvr>
-  <mc:AlternateContent xmlns:mc="http://schemas.openxmlformats.org/markup-compatibility/2006" xmlns:p14="http://schemas.microsoft.com/office/powerpoint/2010/main">
-    <mc:Choice Requires="p14">
-      <p:transition spd="med" p14:dur="700">
-        <p:fade/>
+  <mc:AlternateContent xmlns:mc="http://schemas.openxmlformats.org/markup-compatibility/2006">
+    <mc:Choice xmlns:p14="http://schemas.microsoft.com/office/powerpoint/2010/main" Requires="p14">
+      <p:transition spd="slow" p14:dur="1500">
+        <p14:window dir="vert"/>
       </p:transition>
     </mc:Choice>
-    <mc:Fallback xmlns="">
-      <p:transition spd="med">
+    <mc:Fallback>
+      <p:transition spd="slow">
         <p:fade/>
       </p:transition>
     </mc:Fallback>
@@ -21800,14 +21800,14 @@
   <p:clrMapOvr>
     <a:masterClrMapping/>
   </p:clrMapOvr>
-  <mc:AlternateContent xmlns:mc="http://schemas.openxmlformats.org/markup-compatibility/2006" xmlns:p14="http://schemas.microsoft.com/office/powerpoint/2010/main">
-    <mc:Choice Requires="p14">
-      <p:transition spd="med" p14:dur="700">
-        <p:fade/>
+  <mc:AlternateContent xmlns:mc="http://schemas.openxmlformats.org/markup-compatibility/2006">
+    <mc:Choice xmlns:p14="http://schemas.microsoft.com/office/powerpoint/2010/main" Requires="p14">
+      <p:transition spd="slow" p14:dur="1500">
+        <p14:window dir="vert"/>
       </p:transition>
     </mc:Choice>
-    <mc:Fallback xmlns="">
-      <p:transition spd="med">
+    <mc:Fallback>
+      <p:transition spd="slow">
         <p:fade/>
       </p:transition>
     </mc:Fallback>
@@ -21986,14 +21986,14 @@
   <p:clrMapOvr>
     <a:masterClrMapping/>
   </p:clrMapOvr>
-  <mc:AlternateContent xmlns:mc="http://schemas.openxmlformats.org/markup-compatibility/2006" xmlns:p14="http://schemas.microsoft.com/office/powerpoint/2010/main">
-    <mc:Choice Requires="p14">
-      <p:transition spd="med" p14:dur="700">
-        <p:fade/>
+  <mc:AlternateContent xmlns:mc="http://schemas.openxmlformats.org/markup-compatibility/2006">
+    <mc:Choice xmlns:p14="http://schemas.microsoft.com/office/powerpoint/2010/main" Requires="p14">
+      <p:transition spd="slow" p14:dur="1500">
+        <p14:window dir="vert"/>
       </p:transition>
     </mc:Choice>
-    <mc:Fallback xmlns="">
-      <p:transition spd="med">
+    <mc:Fallback>
+      <p:transition spd="slow">
         <p:fade/>
       </p:transition>
     </mc:Fallback>
@@ -22593,14 +22593,14 @@
   <p:clrMapOvr>
     <a:masterClrMapping/>
   </p:clrMapOvr>
-  <mc:AlternateContent xmlns:mc="http://schemas.openxmlformats.org/markup-compatibility/2006" xmlns:p14="http://schemas.microsoft.com/office/powerpoint/2010/main">
-    <mc:Choice Requires="p14">
-      <p:transition spd="med" p14:dur="700">
-        <p:fade/>
+  <mc:AlternateContent xmlns:mc="http://schemas.openxmlformats.org/markup-compatibility/2006">
+    <mc:Choice xmlns:p14="http://schemas.microsoft.com/office/powerpoint/2010/main" Requires="p14">
+      <p:transition spd="slow" p14:dur="1500">
+        <p14:window dir="vert"/>
       </p:transition>
     </mc:Choice>
-    <mc:Fallback xmlns="">
-      <p:transition spd="med">
+    <mc:Fallback>
+      <p:transition spd="slow">
         <p:fade/>
       </p:transition>
     </mc:Fallback>
@@ -22719,14 +22719,14 @@
   <p:clrMapOvr>
     <a:masterClrMapping/>
   </p:clrMapOvr>
-  <mc:AlternateContent xmlns:mc="http://schemas.openxmlformats.org/markup-compatibility/2006" xmlns:p14="http://schemas.microsoft.com/office/powerpoint/2010/main">
-    <mc:Choice Requires="p14">
-      <p:transition spd="med" p14:dur="700">
-        <p:fade/>
+  <mc:AlternateContent xmlns:mc="http://schemas.openxmlformats.org/markup-compatibility/2006">
+    <mc:Choice xmlns:p14="http://schemas.microsoft.com/office/powerpoint/2010/main" Requires="p14">
+      <p:transition spd="slow" p14:dur="1500">
+        <p14:window dir="vert"/>
       </p:transition>
     </mc:Choice>
-    <mc:Fallback xmlns="">
-      <p:transition spd="med">
+    <mc:Fallback>
+      <p:transition spd="slow">
         <p:fade/>
       </p:transition>
     </mc:Fallback>
@@ -22812,14 +22812,14 @@
   <p:clrMapOvr>
     <a:masterClrMapping/>
   </p:clrMapOvr>
-  <mc:AlternateContent xmlns:mc="http://schemas.openxmlformats.org/markup-compatibility/2006" xmlns:p14="http://schemas.microsoft.com/office/powerpoint/2010/main">
-    <mc:Choice Requires="p14">
-      <p:transition spd="med" p14:dur="700">
-        <p:fade/>
+  <mc:AlternateContent xmlns:mc="http://schemas.openxmlformats.org/markup-compatibility/2006">
+    <mc:Choice xmlns:p14="http://schemas.microsoft.com/office/powerpoint/2010/main" Requires="p14">
+      <p:transition spd="slow" p14:dur="1500">
+        <p14:window dir="vert"/>
       </p:transition>
     </mc:Choice>
-    <mc:Fallback xmlns="">
-      <p:transition spd="med">
+    <mc:Fallback>
+      <p:transition spd="slow">
         <p:fade/>
       </p:transition>
     </mc:Fallback>
@@ -23016,14 +23016,14 @@
   <p:clrMapOvr>
     <a:masterClrMapping/>
   </p:clrMapOvr>
-  <mc:AlternateContent xmlns:mc="http://schemas.openxmlformats.org/markup-compatibility/2006" xmlns:p14="http://schemas.microsoft.com/office/powerpoint/2010/main">
-    <mc:Choice Requires="p14">
-      <p:transition spd="med" p14:dur="700">
-        <p:fade/>
+  <mc:AlternateContent xmlns:mc="http://schemas.openxmlformats.org/markup-compatibility/2006">
+    <mc:Choice xmlns:p14="http://schemas.microsoft.com/office/powerpoint/2010/main" Requires="p14">
+      <p:transition spd="slow" p14:dur="1500">
+        <p14:window dir="vert"/>
       </p:transition>
     </mc:Choice>
-    <mc:Fallback xmlns="">
-      <p:transition spd="med">
+    <mc:Fallback>
+      <p:transition spd="slow">
         <p:fade/>
       </p:transition>
     </mc:Fallback>
@@ -24183,7 +24183,7 @@
           </a:ln>
           <a:extLst>
             <a:ext uri="{91240B29-F687-4f45-9708-019B960494DF}">
-              <a14:hiddenLine xmlns="" xmlns:a14="http://schemas.microsoft.com/office/drawing/2010/main" w="9525">
+              <a14:hiddenLine xmlns:a14="http://schemas.microsoft.com/office/drawing/2010/main" xmlns="" w="9525">
                 <a:solidFill>
                   <a:srgbClr val="000000"/>
                 </a:solidFill>
@@ -24237,7 +24237,7 @@
           </a:ln>
           <a:extLst>
             <a:ext uri="{91240B29-F687-4f45-9708-019B960494DF}">
-              <a14:hiddenLine xmlns="" xmlns:a14="http://schemas.microsoft.com/office/drawing/2010/main" w="9525">
+              <a14:hiddenLine xmlns:a14="http://schemas.microsoft.com/office/drawing/2010/main" xmlns="" w="9525">
                 <a:solidFill>
                   <a:srgbClr val="000000"/>
                 </a:solidFill>
@@ -24402,14 +24402,14 @@
   <p:clrMapOvr>
     <a:masterClrMapping/>
   </p:clrMapOvr>
-  <mc:AlternateContent xmlns:mc="http://schemas.openxmlformats.org/markup-compatibility/2006" xmlns:p14="http://schemas.microsoft.com/office/powerpoint/2010/main">
-    <mc:Choice Requires="p14">
-      <p:transition spd="med" p14:dur="700">
-        <p:fade/>
+  <mc:AlternateContent xmlns:mc="http://schemas.openxmlformats.org/markup-compatibility/2006">
+    <mc:Choice xmlns:p14="http://schemas.microsoft.com/office/powerpoint/2010/main" Requires="p14">
+      <p:transition spd="slow" p14:dur="1500">
+        <p14:window dir="vert"/>
       </p:transition>
     </mc:Choice>
-    <mc:Fallback xmlns="">
-      <p:transition spd="med">
+    <mc:Fallback>
+      <p:transition spd="slow">
         <p:fade/>
       </p:transition>
     </mc:Fallback>
@@ -24495,14 +24495,14 @@
   <p:clrMapOvr>
     <a:masterClrMapping/>
   </p:clrMapOvr>
-  <mc:AlternateContent xmlns:mc="http://schemas.openxmlformats.org/markup-compatibility/2006" xmlns:p14="http://schemas.microsoft.com/office/powerpoint/2010/main">
-    <mc:Choice Requires="p14">
-      <p:transition spd="med" p14:dur="700">
-        <p:fade/>
+  <mc:AlternateContent xmlns:mc="http://schemas.openxmlformats.org/markup-compatibility/2006">
+    <mc:Choice xmlns:p14="http://schemas.microsoft.com/office/powerpoint/2010/main" Requires="p14">
+      <p:transition spd="slow" p14:dur="1500">
+        <p14:window dir="vert"/>
       </p:transition>
     </mc:Choice>
-    <mc:Fallback xmlns="">
-      <p:transition spd="med">
+    <mc:Fallback>
+      <p:transition spd="slow">
         <p:fade/>
       </p:transition>
     </mc:Fallback>
@@ -24748,14 +24748,14 @@
   <p:clrMapOvr>
     <a:masterClrMapping/>
   </p:clrMapOvr>
-  <mc:AlternateContent xmlns:mc="http://schemas.openxmlformats.org/markup-compatibility/2006" xmlns:p14="http://schemas.microsoft.com/office/powerpoint/2010/main">
-    <mc:Choice Requires="p14">
-      <p:transition spd="med" p14:dur="700">
-        <p:fade/>
+  <mc:AlternateContent xmlns:mc="http://schemas.openxmlformats.org/markup-compatibility/2006">
+    <mc:Choice xmlns:p14="http://schemas.microsoft.com/office/powerpoint/2010/main" Requires="p14">
+      <p:transition spd="slow" p14:dur="1500">
+        <p14:window dir="vert"/>
       </p:transition>
     </mc:Choice>
-    <mc:Fallback xmlns="">
-      <p:transition spd="med">
+    <mc:Fallback>
+      <p:transition spd="slow">
         <p:fade/>
       </p:transition>
     </mc:Fallback>
@@ -24845,14 +24845,14 @@
   <p:clrMapOvr>
     <a:masterClrMapping/>
   </p:clrMapOvr>
-  <mc:AlternateContent xmlns:mc="http://schemas.openxmlformats.org/markup-compatibility/2006" xmlns:p14="http://schemas.microsoft.com/office/powerpoint/2010/main">
-    <mc:Choice Requires="p14">
-      <p:transition spd="med" p14:dur="700">
-        <p:fade/>
+  <mc:AlternateContent xmlns:mc="http://schemas.openxmlformats.org/markup-compatibility/2006">
+    <mc:Choice xmlns:p14="http://schemas.microsoft.com/office/powerpoint/2010/main" Requires="p14">
+      <p:transition spd="slow" p14:dur="1500">
+        <p14:window dir="vert"/>
       </p:transition>
     </mc:Choice>
-    <mc:Fallback xmlns="">
-      <p:transition spd="med">
+    <mc:Fallback>
+      <p:transition spd="slow">
         <p:fade/>
       </p:transition>
     </mc:Fallback>

</xml_diff>